<commit_message>
Files for Gems, week 4, threading part 1, added
</commit_message>
<xml_diff>
--- a/6022_Phys 2/D2D/W02 (soft thing, Verlet)/Vertlet integration.pptx
+++ b/6022_Phys 2/D2D/W02 (soft thing, Verlet)/Vertlet integration.pptx
@@ -10,6 +10,8 @@
     <p:sldId id="258" r:id="rId4"/>
     <p:sldId id="259" r:id="rId5"/>
     <p:sldId id="260" r:id="rId6"/>
+    <p:sldId id="261" r:id="rId7"/>
+    <p:sldId id="262" r:id="rId8"/>
   </p:sldIdLst>
   <p:sldSz cx="12192000" cy="6858000"/>
   <p:notesSz cx="6858000" cy="9144000"/>
@@ -247,7 +249,7 @@
           <a:p>
             <a:fld id="{B2683B1B-3CA0-49F0-913E-30D7B5476043}" type="datetimeFigureOut">
               <a:rPr lang="en-CA" smtClean="0"/>
-              <a:t>2024-01-19</a:t>
+              <a:t>2024-01-25</a:t>
             </a:fld>
             <a:endParaRPr lang="en-CA"/>
           </a:p>
@@ -417,7 +419,7 @@
           <a:p>
             <a:fld id="{B2683B1B-3CA0-49F0-913E-30D7B5476043}" type="datetimeFigureOut">
               <a:rPr lang="en-CA" smtClean="0"/>
-              <a:t>2024-01-19</a:t>
+              <a:t>2024-01-25</a:t>
             </a:fld>
             <a:endParaRPr lang="en-CA"/>
           </a:p>
@@ -597,7 +599,7 @@
           <a:p>
             <a:fld id="{B2683B1B-3CA0-49F0-913E-30D7B5476043}" type="datetimeFigureOut">
               <a:rPr lang="en-CA" smtClean="0"/>
-              <a:t>2024-01-19</a:t>
+              <a:t>2024-01-25</a:t>
             </a:fld>
             <a:endParaRPr lang="en-CA"/>
           </a:p>
@@ -767,7 +769,7 @@
           <a:p>
             <a:fld id="{B2683B1B-3CA0-49F0-913E-30D7B5476043}" type="datetimeFigureOut">
               <a:rPr lang="en-CA" smtClean="0"/>
-              <a:t>2024-01-19</a:t>
+              <a:t>2024-01-25</a:t>
             </a:fld>
             <a:endParaRPr lang="en-CA"/>
           </a:p>
@@ -1013,7 +1015,7 @@
           <a:p>
             <a:fld id="{B2683B1B-3CA0-49F0-913E-30D7B5476043}" type="datetimeFigureOut">
               <a:rPr lang="en-CA" smtClean="0"/>
-              <a:t>2024-01-19</a:t>
+              <a:t>2024-01-25</a:t>
             </a:fld>
             <a:endParaRPr lang="en-CA"/>
           </a:p>
@@ -1245,7 +1247,7 @@
           <a:p>
             <a:fld id="{B2683B1B-3CA0-49F0-913E-30D7B5476043}" type="datetimeFigureOut">
               <a:rPr lang="en-CA" smtClean="0"/>
-              <a:t>2024-01-19</a:t>
+              <a:t>2024-01-25</a:t>
             </a:fld>
             <a:endParaRPr lang="en-CA"/>
           </a:p>
@@ -1612,7 +1614,7 @@
           <a:p>
             <a:fld id="{B2683B1B-3CA0-49F0-913E-30D7B5476043}" type="datetimeFigureOut">
               <a:rPr lang="en-CA" smtClean="0"/>
-              <a:t>2024-01-19</a:t>
+              <a:t>2024-01-25</a:t>
             </a:fld>
             <a:endParaRPr lang="en-CA"/>
           </a:p>
@@ -1730,7 +1732,7 @@
           <a:p>
             <a:fld id="{B2683B1B-3CA0-49F0-913E-30D7B5476043}" type="datetimeFigureOut">
               <a:rPr lang="en-CA" smtClean="0"/>
-              <a:t>2024-01-19</a:t>
+              <a:t>2024-01-25</a:t>
             </a:fld>
             <a:endParaRPr lang="en-CA"/>
           </a:p>
@@ -1825,7 +1827,7 @@
           <a:p>
             <a:fld id="{B2683B1B-3CA0-49F0-913E-30D7B5476043}" type="datetimeFigureOut">
               <a:rPr lang="en-CA" smtClean="0"/>
-              <a:t>2024-01-19</a:t>
+              <a:t>2024-01-25</a:t>
             </a:fld>
             <a:endParaRPr lang="en-CA"/>
           </a:p>
@@ -2102,7 +2104,7 @@
           <a:p>
             <a:fld id="{B2683B1B-3CA0-49F0-913E-30D7B5476043}" type="datetimeFigureOut">
               <a:rPr lang="en-CA" smtClean="0"/>
-              <a:t>2024-01-19</a:t>
+              <a:t>2024-01-25</a:t>
             </a:fld>
             <a:endParaRPr lang="en-CA"/>
           </a:p>
@@ -2359,7 +2361,7 @@
           <a:p>
             <a:fld id="{B2683B1B-3CA0-49F0-913E-30D7B5476043}" type="datetimeFigureOut">
               <a:rPr lang="en-CA" smtClean="0"/>
-              <a:t>2024-01-19</a:t>
+              <a:t>2024-01-25</a:t>
             </a:fld>
             <a:endParaRPr lang="en-CA"/>
           </a:p>
@@ -2572,7 +2574,7 @@
           <a:p>
             <a:fld id="{B2683B1B-3CA0-49F0-913E-30D7B5476043}" type="datetimeFigureOut">
               <a:rPr lang="en-CA" smtClean="0"/>
-              <a:t>2024-01-19</a:t>
+              <a:t>2024-01-25</a:t>
             </a:fld>
             <a:endParaRPr lang="en-CA"/>
           </a:p>
@@ -4654,6 +4656,344 @@
     <p:extLst>
       <p:ext uri="{BB962C8B-B14F-4D97-AF65-F5344CB8AC3E}">
         <p14:creationId xmlns:p14="http://schemas.microsoft.com/office/powerpoint/2010/main" val="799925486"/>
+      </p:ext>
+    </p:extLst>
+  </p:cSld>
+  <p:clrMapOvr>
+    <a:masterClrMapping/>
+  </p:clrMapOvr>
+</p:sld>
+</file>
+
+<file path=ppt/slides/slide6.xml><?xml version="1.0" encoding="utf-8"?>
+<p:sld xmlns:a="http://schemas.openxmlformats.org/drawingml/2006/main" xmlns:r="http://schemas.openxmlformats.org/officeDocument/2006/relationships" xmlns:p="http://schemas.openxmlformats.org/presentationml/2006/main">
+  <p:cSld>
+    <p:spTree>
+      <p:nvGrpSpPr>
+        <p:cNvPr id="1" name=""/>
+        <p:cNvGrpSpPr/>
+        <p:nvPr/>
+      </p:nvGrpSpPr>
+      <p:grpSpPr>
+        <a:xfrm>
+          <a:off x="0" y="0"/>
+          <a:ext cx="0" cy="0"/>
+          <a:chOff x="0" y="0"/>
+          <a:chExt cx="0" cy="0"/>
+        </a:xfrm>
+      </p:grpSpPr>
+      <p:sp>
+        <p:nvSpPr>
+          <p:cNvPr id="2" name="Title 1">
+            <a:extLst>
+              <a:ext uri="{FF2B5EF4-FFF2-40B4-BE49-F238E27FC236}">
+                <a16:creationId xmlns:a16="http://schemas.microsoft.com/office/drawing/2014/main" id="{E4751C9E-ECFA-B681-56C0-8A5DC0D313DB}"/>
+              </a:ext>
+            </a:extLst>
+          </p:cNvPr>
+          <p:cNvSpPr>
+            <a:spLocks noGrp="1"/>
+          </p:cNvSpPr>
+          <p:nvPr>
+            <p:ph type="title"/>
+          </p:nvPr>
+        </p:nvSpPr>
+        <p:spPr/>
+        <p:txBody>
+          <a:bodyPr/>
+          <a:lstStyle/>
+          <a:p>
+            <a:r>
+              <a:rPr lang="en-CA" dirty="0"/>
+              <a:t>Regenerating the mesh in 3D</a:t>
+            </a:r>
+          </a:p>
+        </p:txBody>
+      </p:sp>
+      <p:sp>
+        <p:nvSpPr>
+          <p:cNvPr id="3" name="Content Placeholder 2">
+            <a:extLst>
+              <a:ext uri="{FF2B5EF4-FFF2-40B4-BE49-F238E27FC236}">
+                <a16:creationId xmlns:a16="http://schemas.microsoft.com/office/drawing/2014/main" id="{9226EC3C-8615-13E9-8ABC-C6DCB53709BB}"/>
+              </a:ext>
+            </a:extLst>
+          </p:cNvPr>
+          <p:cNvSpPr>
+            <a:spLocks noGrp="1"/>
+          </p:cNvSpPr>
+          <p:nvPr>
+            <p:ph idx="1"/>
+          </p:nvPr>
+        </p:nvSpPr>
+        <p:spPr/>
+        <p:txBody>
+          <a:bodyPr>
+            <a:normAutofit lnSpcReduction="10000"/>
+          </a:bodyPr>
+          <a:lstStyle/>
+          <a:p>
+            <a:r>
+              <a:rPr lang="en-CA" dirty="0">
+                <a:sym typeface="Wingdings" panose="05000000000000000000" pitchFamily="2" charset="2"/>
+              </a:rPr>
+              <a:t>What will change is the position and normal</a:t>
+            </a:r>
+          </a:p>
+          <a:p>
+            <a:r>
+              <a:rPr lang="en-CA" dirty="0">
+                <a:sym typeface="Wingdings" panose="05000000000000000000" pitchFamily="2" charset="2"/>
+              </a:rPr>
+              <a:t>The UVs and colours won’t change</a:t>
+            </a:r>
+          </a:p>
+          <a:p>
+            <a:r>
+              <a:rPr lang="en-CA" dirty="0">
+                <a:sym typeface="Wingdings" panose="05000000000000000000" pitchFamily="2" charset="2"/>
+              </a:rPr>
+              <a:t>Positions will be handled by the </a:t>
+            </a:r>
+            <a:r>
+              <a:rPr lang="en-CA" dirty="0" err="1">
+                <a:sym typeface="Wingdings" panose="05000000000000000000" pitchFamily="2" charset="2"/>
+              </a:rPr>
+              <a:t>verlet</a:t>
+            </a:r>
+            <a:r>
+              <a:rPr lang="en-CA" dirty="0">
+                <a:sym typeface="Wingdings" panose="05000000000000000000" pitchFamily="2" charset="2"/>
+              </a:rPr>
+              <a:t> integration itself</a:t>
+            </a:r>
+          </a:p>
+          <a:p>
+            <a:r>
+              <a:rPr lang="en-CA" dirty="0" err="1">
+                <a:sym typeface="Wingdings" panose="05000000000000000000" pitchFamily="2" charset="2"/>
+              </a:rPr>
+              <a:t>Normals</a:t>
+            </a:r>
+            <a:r>
+              <a:rPr lang="en-CA" dirty="0">
+                <a:sym typeface="Wingdings" panose="05000000000000000000" pitchFamily="2" charset="2"/>
+              </a:rPr>
+              <a:t> – for shared vertices</a:t>
+            </a:r>
+          </a:p>
+          <a:p>
+            <a:pPr lvl="1"/>
+            <a:r>
+              <a:rPr lang="en-CA" dirty="0">
+                <a:sym typeface="Wingdings" panose="05000000000000000000" pitchFamily="2" charset="2"/>
+              </a:rPr>
+              <a:t>Go through each triangle and calculate the normal (for that triangle)</a:t>
+            </a:r>
+          </a:p>
+          <a:p>
+            <a:pPr lvl="1"/>
+            <a:r>
+              <a:rPr lang="en-CA" dirty="0">
+                <a:sym typeface="Wingdings" panose="05000000000000000000" pitchFamily="2" charset="2"/>
+              </a:rPr>
+              <a:t>Go through each vertex and add up ALL </a:t>
+            </a:r>
+            <a:r>
+              <a:rPr lang="en-CA" dirty="0" err="1">
+                <a:sym typeface="Wingdings" panose="05000000000000000000" pitchFamily="2" charset="2"/>
+              </a:rPr>
+              <a:t>normals</a:t>
+            </a:r>
+            <a:r>
+              <a:rPr lang="en-CA" dirty="0">
+                <a:sym typeface="Wingdings" panose="05000000000000000000" pitchFamily="2" charset="2"/>
+              </a:rPr>
+              <a:t> for associated triangles.</a:t>
+            </a:r>
+          </a:p>
+          <a:p>
+            <a:pPr lvl="2"/>
+            <a:r>
+              <a:rPr lang="en-CA" dirty="0">
+                <a:sym typeface="Wingdings" panose="05000000000000000000" pitchFamily="2" charset="2"/>
+              </a:rPr>
+              <a:t>This will give an average of all the </a:t>
+            </a:r>
+            <a:r>
+              <a:rPr lang="en-CA" dirty="0" err="1">
+                <a:sym typeface="Wingdings" panose="05000000000000000000" pitchFamily="2" charset="2"/>
+              </a:rPr>
+              <a:t>normals</a:t>
+            </a:r>
+            <a:r>
+              <a:rPr lang="en-CA" dirty="0">
+                <a:sym typeface="Wingdings" panose="05000000000000000000" pitchFamily="2" charset="2"/>
+              </a:rPr>
+              <a:t> but it will be too long </a:t>
+            </a:r>
+          </a:p>
+          <a:p>
+            <a:pPr lvl="1"/>
+            <a:r>
+              <a:rPr lang="en-CA" dirty="0">
+                <a:sym typeface="Wingdings" panose="05000000000000000000" pitchFamily="2" charset="2"/>
+              </a:rPr>
+              <a:t>Go through and normalize the accumulated </a:t>
+            </a:r>
+            <a:r>
+              <a:rPr lang="en-CA" dirty="0" err="1">
+                <a:sym typeface="Wingdings" panose="05000000000000000000" pitchFamily="2" charset="2"/>
+              </a:rPr>
+              <a:t>normals</a:t>
+            </a:r>
+            <a:endParaRPr lang="en-CA" dirty="0">
+              <a:sym typeface="Wingdings" panose="05000000000000000000" pitchFamily="2" charset="2"/>
+            </a:endParaRPr>
+          </a:p>
+          <a:p>
+            <a:r>
+              <a:rPr lang="en-CA" dirty="0">
+                <a:sym typeface="Wingdings" panose="05000000000000000000" pitchFamily="2" charset="2"/>
+              </a:rPr>
+              <a:t> Then we update the vertex info on the GPU</a:t>
+            </a:r>
+          </a:p>
+          <a:p>
+            <a:pPr lvl="1"/>
+            <a:r>
+              <a:rPr lang="en-CA" dirty="0">
+                <a:sym typeface="Wingdings" panose="05000000000000000000" pitchFamily="2" charset="2"/>
+              </a:rPr>
+              <a:t>Call </a:t>
+            </a:r>
+            <a:r>
+              <a:rPr lang="en-CA" dirty="0" err="1">
+                <a:sym typeface="Wingdings" panose="05000000000000000000" pitchFamily="2" charset="2"/>
+              </a:rPr>
+              <a:t>glBufferSubData</a:t>
+            </a:r>
+            <a:r>
+              <a:rPr lang="en-CA" dirty="0">
+                <a:sym typeface="Wingdings" panose="05000000000000000000" pitchFamily="2" charset="2"/>
+              </a:rPr>
+              <a:t>() NOT </a:t>
+            </a:r>
+            <a:r>
+              <a:rPr lang="en-CA" dirty="0" err="1">
+                <a:sym typeface="Wingdings" panose="05000000000000000000" pitchFamily="2" charset="2"/>
+              </a:rPr>
+              <a:t>glBufferData</a:t>
+            </a:r>
+            <a:r>
+              <a:rPr lang="en-CA" dirty="0">
+                <a:sym typeface="Wingdings" panose="05000000000000000000" pitchFamily="2" charset="2"/>
+              </a:rPr>
+              <a:t>()  this one will REPLACE</a:t>
+            </a:r>
+            <a:endParaRPr lang="en-CA" dirty="0"/>
+          </a:p>
+          <a:p>
+            <a:endParaRPr lang="en-CA" dirty="0"/>
+          </a:p>
+        </p:txBody>
+      </p:sp>
+    </p:spTree>
+    <p:extLst>
+      <p:ext uri="{BB962C8B-B14F-4D97-AF65-F5344CB8AC3E}">
+        <p14:creationId xmlns:p14="http://schemas.microsoft.com/office/powerpoint/2010/main" val="4290214515"/>
+      </p:ext>
+    </p:extLst>
+  </p:cSld>
+  <p:clrMapOvr>
+    <a:masterClrMapping/>
+  </p:clrMapOvr>
+</p:sld>
+</file>
+
+<file path=ppt/slides/slide7.xml><?xml version="1.0" encoding="utf-8"?>
+<p:sld xmlns:a="http://schemas.openxmlformats.org/drawingml/2006/main" xmlns:r="http://schemas.openxmlformats.org/officeDocument/2006/relationships" xmlns:p="http://schemas.openxmlformats.org/presentationml/2006/main">
+  <p:cSld>
+    <p:spTree>
+      <p:nvGrpSpPr>
+        <p:cNvPr id="1" name=""/>
+        <p:cNvGrpSpPr/>
+        <p:nvPr/>
+      </p:nvGrpSpPr>
+      <p:grpSpPr>
+        <a:xfrm>
+          <a:off x="0" y="0"/>
+          <a:ext cx="0" cy="0"/>
+          <a:chOff x="0" y="0"/>
+          <a:chExt cx="0" cy="0"/>
+        </a:xfrm>
+      </p:grpSpPr>
+      <p:sp>
+        <p:nvSpPr>
+          <p:cNvPr id="2" name="Title 1">
+            <a:extLst>
+              <a:ext uri="{FF2B5EF4-FFF2-40B4-BE49-F238E27FC236}">
+                <a16:creationId xmlns:a16="http://schemas.microsoft.com/office/drawing/2014/main" id="{E4751C9E-ECFA-B681-56C0-8A5DC0D313DB}"/>
+              </a:ext>
+            </a:extLst>
+          </p:cNvPr>
+          <p:cNvSpPr>
+            <a:spLocks noGrp="1"/>
+          </p:cNvSpPr>
+          <p:nvPr>
+            <p:ph type="title"/>
+          </p:nvPr>
+        </p:nvSpPr>
+        <p:spPr/>
+        <p:txBody>
+          <a:bodyPr/>
+          <a:lstStyle/>
+          <a:p>
+            <a:r>
+              <a:rPr lang="en-CA" dirty="0"/>
+              <a:t>Regenerating the mesh in 3D</a:t>
+            </a:r>
+          </a:p>
+        </p:txBody>
+      </p:sp>
+      <p:sp>
+        <p:nvSpPr>
+          <p:cNvPr id="3" name="Content Placeholder 2">
+            <a:extLst>
+              <a:ext uri="{FF2B5EF4-FFF2-40B4-BE49-F238E27FC236}">
+                <a16:creationId xmlns:a16="http://schemas.microsoft.com/office/drawing/2014/main" id="{9226EC3C-8615-13E9-8ABC-C6DCB53709BB}"/>
+              </a:ext>
+            </a:extLst>
+          </p:cNvPr>
+          <p:cNvSpPr>
+            <a:spLocks noGrp="1"/>
+          </p:cNvSpPr>
+          <p:nvPr>
+            <p:ph idx="1"/>
+          </p:nvPr>
+        </p:nvSpPr>
+        <p:spPr/>
+        <p:txBody>
+          <a:bodyPr/>
+          <a:lstStyle/>
+          <a:p>
+            <a:r>
+              <a:rPr lang="en-CA" dirty="0">
+                <a:sym typeface="Wingdings" panose="05000000000000000000" pitchFamily="2" charset="2"/>
+              </a:rPr>
+              <a:t>You can sort of do this in the geometry shader</a:t>
+            </a:r>
+            <a:endParaRPr lang="en-CA" dirty="0"/>
+          </a:p>
+          <a:p>
+            <a:endParaRPr lang="en-CA" dirty="0"/>
+          </a:p>
+        </p:txBody>
+      </p:sp>
+    </p:spTree>
+    <p:extLst>
+      <p:ext uri="{BB962C8B-B14F-4D97-AF65-F5344CB8AC3E}">
+        <p14:creationId xmlns:p14="http://schemas.microsoft.com/office/powerpoint/2010/main" val="1889977979"/>
       </p:ext>
     </p:extLst>
   </p:cSld>

</xml_diff>